<commit_message>
added some analyses and figure changes
</commit_message>
<xml_diff>
--- a/Prelim_Figs/altFigs.pptx
+++ b/Prelim_Figs/altFigs.pptx
@@ -5,7 +5,8 @@
     <p:sldMasterId id="2147483648" r:id="rId1"/>
   </p:sldMasterIdLst>
   <p:sldIdLst>
-    <p:sldId id="256" r:id="rId2"/>
+    <p:sldId id="258" r:id="rId2"/>
+    <p:sldId id="259" r:id="rId3"/>
   </p:sldIdLst>
   <p:sldSz cx="12192000" cy="6858000"/>
   <p:notesSz cx="6858000" cy="9144000"/>
@@ -259,7 +260,7 @@
           <a:p>
             <a:fld id="{5182DFAF-0345-6745-A97D-227066BFF07B}" type="datetimeFigureOut">
               <a:rPr lang="en-US" smtClean="0"/>
-              <a:t>9/1/21</a:t>
+              <a:t>3/9/22</a:t>
             </a:fld>
             <a:endParaRPr lang="en-US"/>
           </a:p>
@@ -457,7 +458,7 @@
           <a:p>
             <a:fld id="{5182DFAF-0345-6745-A97D-227066BFF07B}" type="datetimeFigureOut">
               <a:rPr lang="en-US" smtClean="0"/>
-              <a:t>9/1/21</a:t>
+              <a:t>3/9/22</a:t>
             </a:fld>
             <a:endParaRPr lang="en-US"/>
           </a:p>
@@ -665,7 +666,7 @@
           <a:p>
             <a:fld id="{5182DFAF-0345-6745-A97D-227066BFF07B}" type="datetimeFigureOut">
               <a:rPr lang="en-US" smtClean="0"/>
-              <a:t>9/1/21</a:t>
+              <a:t>3/9/22</a:t>
             </a:fld>
             <a:endParaRPr lang="en-US"/>
           </a:p>
@@ -863,7 +864,7 @@
           <a:p>
             <a:fld id="{5182DFAF-0345-6745-A97D-227066BFF07B}" type="datetimeFigureOut">
               <a:rPr lang="en-US" smtClean="0"/>
-              <a:t>9/1/21</a:t>
+              <a:t>3/9/22</a:t>
             </a:fld>
             <a:endParaRPr lang="en-US"/>
           </a:p>
@@ -1138,7 +1139,7 @@
           <a:p>
             <a:fld id="{5182DFAF-0345-6745-A97D-227066BFF07B}" type="datetimeFigureOut">
               <a:rPr lang="en-US" smtClean="0"/>
-              <a:t>9/1/21</a:t>
+              <a:t>3/9/22</a:t>
             </a:fld>
             <a:endParaRPr lang="en-US"/>
           </a:p>
@@ -1403,7 +1404,7 @@
           <a:p>
             <a:fld id="{5182DFAF-0345-6745-A97D-227066BFF07B}" type="datetimeFigureOut">
               <a:rPr lang="en-US" smtClean="0"/>
-              <a:t>9/1/21</a:t>
+              <a:t>3/9/22</a:t>
             </a:fld>
             <a:endParaRPr lang="en-US"/>
           </a:p>
@@ -1815,7 +1816,7 @@
           <a:p>
             <a:fld id="{5182DFAF-0345-6745-A97D-227066BFF07B}" type="datetimeFigureOut">
               <a:rPr lang="en-US" smtClean="0"/>
-              <a:t>9/1/21</a:t>
+              <a:t>3/9/22</a:t>
             </a:fld>
             <a:endParaRPr lang="en-US"/>
           </a:p>
@@ -1956,7 +1957,7 @@
           <a:p>
             <a:fld id="{5182DFAF-0345-6745-A97D-227066BFF07B}" type="datetimeFigureOut">
               <a:rPr lang="en-US" smtClean="0"/>
-              <a:t>9/1/21</a:t>
+              <a:t>3/9/22</a:t>
             </a:fld>
             <a:endParaRPr lang="en-US"/>
           </a:p>
@@ -2069,7 +2070,7 @@
           <a:p>
             <a:fld id="{5182DFAF-0345-6745-A97D-227066BFF07B}" type="datetimeFigureOut">
               <a:rPr lang="en-US" smtClean="0"/>
-              <a:t>9/1/21</a:t>
+              <a:t>3/9/22</a:t>
             </a:fld>
             <a:endParaRPr lang="en-US"/>
           </a:p>
@@ -2380,7 +2381,7 @@
           <a:p>
             <a:fld id="{5182DFAF-0345-6745-A97D-227066BFF07B}" type="datetimeFigureOut">
               <a:rPr lang="en-US" smtClean="0"/>
-              <a:t>9/1/21</a:t>
+              <a:t>3/9/22</a:t>
             </a:fld>
             <a:endParaRPr lang="en-US"/>
           </a:p>
@@ -2668,7 +2669,7 @@
           <a:p>
             <a:fld id="{5182DFAF-0345-6745-A97D-227066BFF07B}" type="datetimeFigureOut">
               <a:rPr lang="en-US" smtClean="0"/>
-              <a:t>9/1/21</a:t>
+              <a:t>3/9/22</a:t>
             </a:fld>
             <a:endParaRPr lang="en-US"/>
           </a:p>
@@ -2909,7 +2910,7 @@
           <a:p>
             <a:fld id="{5182DFAF-0345-6745-A97D-227066BFF07B}" type="datetimeFigureOut">
               <a:rPr lang="en-US" smtClean="0"/>
-              <a:t>9/1/21</a:t>
+              <a:t>3/9/22</a:t>
             </a:fld>
             <a:endParaRPr lang="en-US"/>
           </a:p>
@@ -3328,10 +3329,10 @@
       </p:grpSpPr>
       <p:pic>
         <p:nvPicPr>
-          <p:cNvPr id="5" name="Picture 4">
-            <a:extLst>
-              <a:ext uri="{FF2B5EF4-FFF2-40B4-BE49-F238E27FC236}">
-                <a16:creationId xmlns:a16="http://schemas.microsoft.com/office/drawing/2014/main" id="{91B0CC10-3311-5442-BE02-0BF1C85B0D31}"/>
+          <p:cNvPr id="9" name="Picture 8">
+            <a:extLst>
+              <a:ext uri="{FF2B5EF4-FFF2-40B4-BE49-F238E27FC236}">
+                <a16:creationId xmlns:a16="http://schemas.microsoft.com/office/drawing/2014/main" id="{9806E827-7FA0-EE45-BF12-8FF1E3222148}"/>
               </a:ext>
             </a:extLst>
           </p:cNvPr>
@@ -3348,20 +3349,697 @@
         </p:blipFill>
         <p:spPr>
           <a:xfrm>
-            <a:off x="269823" y="352716"/>
-            <a:ext cx="7629993" cy="6152568"/>
+            <a:off x="469898" y="588430"/>
+            <a:ext cx="7155452" cy="6083300"/>
           </a:xfrm>
           <a:prstGeom prst="rect">
             <a:avLst/>
           </a:prstGeom>
         </p:spPr>
       </p:pic>
+      <p:sp>
+        <p:nvSpPr>
+          <p:cNvPr id="10" name="TextBox 9">
+            <a:extLst>
+              <a:ext uri="{FF2B5EF4-FFF2-40B4-BE49-F238E27FC236}">
+                <a16:creationId xmlns:a16="http://schemas.microsoft.com/office/drawing/2014/main" id="{B4D2D290-D3F5-9248-A709-D806130A9796}"/>
+              </a:ext>
+            </a:extLst>
+          </p:cNvPr>
+          <p:cNvSpPr txBox="1"/>
+          <p:nvPr/>
+        </p:nvSpPr>
+        <p:spPr>
+          <a:xfrm>
+            <a:off x="277667" y="3206345"/>
+            <a:ext cx="661996" cy="338554"/>
+          </a:xfrm>
+          <a:prstGeom prst="rect">
+            <a:avLst/>
+          </a:prstGeom>
+          <a:noFill/>
+        </p:spPr>
+        <p:txBody>
+          <a:bodyPr wrap="square" rtlCol="0">
+            <a:spAutoFit/>
+          </a:bodyPr>
+          <a:lstStyle/>
+          <a:p>
+            <a:r>
+              <a:rPr lang="en-US" sz="1600" dirty="0"/>
+              <a:t>n = 1</a:t>
+            </a:r>
+          </a:p>
+        </p:txBody>
+      </p:sp>
+      <p:sp>
+        <p:nvSpPr>
+          <p:cNvPr id="11" name="Triangle 10">
+            <a:extLst>
+              <a:ext uri="{FF2B5EF4-FFF2-40B4-BE49-F238E27FC236}">
+                <a16:creationId xmlns:a16="http://schemas.microsoft.com/office/drawing/2014/main" id="{43A09D5A-D3E4-3549-9EE7-629CB0F67B74}"/>
+              </a:ext>
+            </a:extLst>
+          </p:cNvPr>
+          <p:cNvSpPr/>
+          <p:nvPr/>
+        </p:nvSpPr>
+        <p:spPr>
+          <a:xfrm>
+            <a:off x="88604" y="3288418"/>
+            <a:ext cx="202312" cy="174407"/>
+          </a:xfrm>
+          <a:prstGeom prst="triangle">
+            <a:avLst/>
+          </a:prstGeom>
+          <a:solidFill>
+            <a:schemeClr val="accent6">
+              <a:lumMod val="75000"/>
+            </a:schemeClr>
+          </a:solidFill>
+        </p:spPr>
+        <p:style>
+          <a:lnRef idx="2">
+            <a:schemeClr val="dk1"/>
+          </a:lnRef>
+          <a:fillRef idx="1">
+            <a:schemeClr val="lt1"/>
+          </a:fillRef>
+          <a:effectRef idx="0">
+            <a:schemeClr val="dk1"/>
+          </a:effectRef>
+          <a:fontRef idx="minor">
+            <a:schemeClr val="dk1"/>
+          </a:fontRef>
+        </p:style>
+        <p:txBody>
+          <a:bodyPr rtlCol="0" anchor="ctr"/>
+          <a:lstStyle/>
+          <a:p>
+            <a:pPr algn="ctr"/>
+            <a:endParaRPr lang="en-US"/>
+          </a:p>
+        </p:txBody>
+      </p:sp>
+      <p:sp>
+        <p:nvSpPr>
+          <p:cNvPr id="14" name="TextBox 13">
+            <a:extLst>
+              <a:ext uri="{FF2B5EF4-FFF2-40B4-BE49-F238E27FC236}">
+                <a16:creationId xmlns:a16="http://schemas.microsoft.com/office/drawing/2014/main" id="{6ADCA5A2-DB02-4546-866E-68B78679016B}"/>
+              </a:ext>
+            </a:extLst>
+          </p:cNvPr>
+          <p:cNvSpPr txBox="1"/>
+          <p:nvPr/>
+        </p:nvSpPr>
+        <p:spPr>
+          <a:xfrm>
+            <a:off x="3409263" y="525789"/>
+            <a:ext cx="661996" cy="338554"/>
+          </a:xfrm>
+          <a:prstGeom prst="rect">
+            <a:avLst/>
+          </a:prstGeom>
+          <a:noFill/>
+        </p:spPr>
+        <p:txBody>
+          <a:bodyPr wrap="square" rtlCol="0">
+            <a:spAutoFit/>
+          </a:bodyPr>
+          <a:lstStyle/>
+          <a:p>
+            <a:r>
+              <a:rPr lang="en-US" sz="1600" dirty="0"/>
+              <a:t>n = 1</a:t>
+            </a:r>
+          </a:p>
+        </p:txBody>
+      </p:sp>
+      <p:sp>
+        <p:nvSpPr>
+          <p:cNvPr id="15" name="Triangle 14">
+            <a:extLst>
+              <a:ext uri="{FF2B5EF4-FFF2-40B4-BE49-F238E27FC236}">
+                <a16:creationId xmlns:a16="http://schemas.microsoft.com/office/drawing/2014/main" id="{69AB3D17-C26E-6745-92A8-CDBCA9AB641B}"/>
+              </a:ext>
+            </a:extLst>
+          </p:cNvPr>
+          <p:cNvSpPr/>
+          <p:nvPr/>
+        </p:nvSpPr>
+        <p:spPr>
+          <a:xfrm>
+            <a:off x="3220200" y="692527"/>
+            <a:ext cx="202312" cy="174407"/>
+          </a:xfrm>
+          <a:prstGeom prst="triangle">
+            <a:avLst/>
+          </a:prstGeom>
+          <a:solidFill>
+            <a:schemeClr val="accent6">
+              <a:lumMod val="75000"/>
+            </a:schemeClr>
+          </a:solidFill>
+        </p:spPr>
+        <p:style>
+          <a:lnRef idx="2">
+            <a:schemeClr val="dk1"/>
+          </a:lnRef>
+          <a:fillRef idx="1">
+            <a:schemeClr val="lt1"/>
+          </a:fillRef>
+          <a:effectRef idx="0">
+            <a:schemeClr val="dk1"/>
+          </a:effectRef>
+          <a:fontRef idx="minor">
+            <a:schemeClr val="dk1"/>
+          </a:fontRef>
+        </p:style>
+        <p:txBody>
+          <a:bodyPr rtlCol="0" anchor="ctr"/>
+          <a:lstStyle/>
+          <a:p>
+            <a:pPr algn="ctr"/>
+            <a:endParaRPr lang="en-US"/>
+          </a:p>
+        </p:txBody>
+      </p:sp>
+      <p:sp>
+        <p:nvSpPr>
+          <p:cNvPr id="16" name="TextBox 15">
+            <a:extLst>
+              <a:ext uri="{FF2B5EF4-FFF2-40B4-BE49-F238E27FC236}">
+                <a16:creationId xmlns:a16="http://schemas.microsoft.com/office/drawing/2014/main" id="{8E4DCC4B-21F3-DC4C-A8B4-46388D2976B8}"/>
+              </a:ext>
+            </a:extLst>
+          </p:cNvPr>
+          <p:cNvSpPr txBox="1"/>
+          <p:nvPr/>
+        </p:nvSpPr>
+        <p:spPr>
+          <a:xfrm>
+            <a:off x="1824477" y="1053500"/>
+            <a:ext cx="661996" cy="338554"/>
+          </a:xfrm>
+          <a:prstGeom prst="rect">
+            <a:avLst/>
+          </a:prstGeom>
+          <a:noFill/>
+        </p:spPr>
+        <p:txBody>
+          <a:bodyPr wrap="square" rtlCol="0">
+            <a:spAutoFit/>
+          </a:bodyPr>
+          <a:lstStyle/>
+          <a:p>
+            <a:r>
+              <a:rPr lang="en-US" sz="1600" dirty="0"/>
+              <a:t>n = 1</a:t>
+            </a:r>
+          </a:p>
+        </p:txBody>
+      </p:sp>
+      <p:sp>
+        <p:nvSpPr>
+          <p:cNvPr id="17" name="Triangle 16">
+            <a:extLst>
+              <a:ext uri="{FF2B5EF4-FFF2-40B4-BE49-F238E27FC236}">
+                <a16:creationId xmlns:a16="http://schemas.microsoft.com/office/drawing/2014/main" id="{ECD4F8B1-FCB8-B74C-9151-452C353BC278}"/>
+              </a:ext>
+            </a:extLst>
+          </p:cNvPr>
+          <p:cNvSpPr/>
+          <p:nvPr/>
+        </p:nvSpPr>
+        <p:spPr>
+          <a:xfrm>
+            <a:off x="1635414" y="1135573"/>
+            <a:ext cx="202312" cy="174407"/>
+          </a:xfrm>
+          <a:prstGeom prst="triangle">
+            <a:avLst/>
+          </a:prstGeom>
+          <a:solidFill>
+            <a:schemeClr val="accent6">
+              <a:lumMod val="75000"/>
+            </a:schemeClr>
+          </a:solidFill>
+        </p:spPr>
+        <p:style>
+          <a:lnRef idx="2">
+            <a:schemeClr val="dk1"/>
+          </a:lnRef>
+          <a:fillRef idx="1">
+            <a:schemeClr val="lt1"/>
+          </a:fillRef>
+          <a:effectRef idx="0">
+            <a:schemeClr val="dk1"/>
+          </a:effectRef>
+          <a:fontRef idx="minor">
+            <a:schemeClr val="dk1"/>
+          </a:fontRef>
+        </p:style>
+        <p:txBody>
+          <a:bodyPr rtlCol="0" anchor="ctr"/>
+          <a:lstStyle/>
+          <a:p>
+            <a:pPr algn="ctr"/>
+            <a:endParaRPr lang="en-US"/>
+          </a:p>
+        </p:txBody>
+      </p:sp>
+      <p:sp>
+        <p:nvSpPr>
+          <p:cNvPr id="18" name="TextBox 17">
+            <a:extLst>
+              <a:ext uri="{FF2B5EF4-FFF2-40B4-BE49-F238E27FC236}">
+                <a16:creationId xmlns:a16="http://schemas.microsoft.com/office/drawing/2014/main" id="{8FFC8B58-8DDC-0244-83E1-B2F2EF108DE5}"/>
+              </a:ext>
+            </a:extLst>
+          </p:cNvPr>
+          <p:cNvSpPr txBox="1"/>
+          <p:nvPr/>
+        </p:nvSpPr>
+        <p:spPr>
+          <a:xfrm>
+            <a:off x="2003809" y="6105182"/>
+            <a:ext cx="661996" cy="338554"/>
+          </a:xfrm>
+          <a:prstGeom prst="rect">
+            <a:avLst/>
+          </a:prstGeom>
+          <a:noFill/>
+        </p:spPr>
+        <p:txBody>
+          <a:bodyPr wrap="square" rtlCol="0">
+            <a:spAutoFit/>
+          </a:bodyPr>
+          <a:lstStyle/>
+          <a:p>
+            <a:r>
+              <a:rPr lang="en-US" sz="1600" dirty="0"/>
+              <a:t>n = 5</a:t>
+            </a:r>
+          </a:p>
+        </p:txBody>
+      </p:sp>
+      <p:sp>
+        <p:nvSpPr>
+          <p:cNvPr id="19" name="Triangle 18">
+            <a:extLst>
+              <a:ext uri="{FF2B5EF4-FFF2-40B4-BE49-F238E27FC236}">
+                <a16:creationId xmlns:a16="http://schemas.microsoft.com/office/drawing/2014/main" id="{E86A6906-A9A4-3044-B3EA-F2EC2F0F5B2A}"/>
+              </a:ext>
+            </a:extLst>
+          </p:cNvPr>
+          <p:cNvSpPr/>
+          <p:nvPr/>
+        </p:nvSpPr>
+        <p:spPr>
+          <a:xfrm>
+            <a:off x="1814746" y="6187255"/>
+            <a:ext cx="202312" cy="174407"/>
+          </a:xfrm>
+          <a:prstGeom prst="triangle">
+            <a:avLst/>
+          </a:prstGeom>
+          <a:solidFill>
+            <a:schemeClr val="accent6">
+              <a:lumMod val="75000"/>
+            </a:schemeClr>
+          </a:solidFill>
+        </p:spPr>
+        <p:style>
+          <a:lnRef idx="2">
+            <a:schemeClr val="dk1"/>
+          </a:lnRef>
+          <a:fillRef idx="1">
+            <a:schemeClr val="lt1"/>
+          </a:fillRef>
+          <a:effectRef idx="0">
+            <a:schemeClr val="dk1"/>
+          </a:effectRef>
+          <a:fontRef idx="minor">
+            <a:schemeClr val="dk1"/>
+          </a:fontRef>
+        </p:style>
+        <p:txBody>
+          <a:bodyPr rtlCol="0" anchor="ctr"/>
+          <a:lstStyle/>
+          <a:p>
+            <a:pPr algn="ctr"/>
+            <a:endParaRPr lang="en-US"/>
+          </a:p>
+        </p:txBody>
+      </p:sp>
+      <p:sp>
+        <p:nvSpPr>
+          <p:cNvPr id="20" name="TextBox 19">
+            <a:extLst>
+              <a:ext uri="{FF2B5EF4-FFF2-40B4-BE49-F238E27FC236}">
+                <a16:creationId xmlns:a16="http://schemas.microsoft.com/office/drawing/2014/main" id="{8DC86E50-A2A2-A44F-9F25-640D24B49D52}"/>
+              </a:ext>
+            </a:extLst>
+          </p:cNvPr>
+          <p:cNvSpPr txBox="1"/>
+          <p:nvPr/>
+        </p:nvSpPr>
+        <p:spPr>
+          <a:xfrm>
+            <a:off x="4439549" y="6529723"/>
+            <a:ext cx="661996" cy="338554"/>
+          </a:xfrm>
+          <a:prstGeom prst="rect">
+            <a:avLst/>
+          </a:prstGeom>
+          <a:noFill/>
+        </p:spPr>
+        <p:txBody>
+          <a:bodyPr wrap="square" rtlCol="0">
+            <a:spAutoFit/>
+          </a:bodyPr>
+          <a:lstStyle/>
+          <a:p>
+            <a:r>
+              <a:rPr lang="en-US" sz="1600" dirty="0"/>
+              <a:t>n = 2</a:t>
+            </a:r>
+          </a:p>
+        </p:txBody>
+      </p:sp>
+      <p:sp>
+        <p:nvSpPr>
+          <p:cNvPr id="21" name="Triangle 20">
+            <a:extLst>
+              <a:ext uri="{FF2B5EF4-FFF2-40B4-BE49-F238E27FC236}">
+                <a16:creationId xmlns:a16="http://schemas.microsoft.com/office/drawing/2014/main" id="{FAD27079-4BE7-2445-A787-3494D3DB9489}"/>
+              </a:ext>
+            </a:extLst>
+          </p:cNvPr>
+          <p:cNvSpPr/>
+          <p:nvPr/>
+        </p:nvSpPr>
+        <p:spPr>
+          <a:xfrm>
+            <a:off x="4267419" y="6510198"/>
+            <a:ext cx="202312" cy="174407"/>
+          </a:xfrm>
+          <a:prstGeom prst="triangle">
+            <a:avLst/>
+          </a:prstGeom>
+          <a:solidFill>
+            <a:schemeClr val="accent6">
+              <a:lumMod val="75000"/>
+            </a:schemeClr>
+          </a:solidFill>
+        </p:spPr>
+        <p:style>
+          <a:lnRef idx="2">
+            <a:schemeClr val="dk1"/>
+          </a:lnRef>
+          <a:fillRef idx="1">
+            <a:schemeClr val="lt1"/>
+          </a:fillRef>
+          <a:effectRef idx="0">
+            <a:schemeClr val="dk1"/>
+          </a:effectRef>
+          <a:fontRef idx="minor">
+            <a:schemeClr val="dk1"/>
+          </a:fontRef>
+        </p:style>
+        <p:txBody>
+          <a:bodyPr rtlCol="0" anchor="ctr"/>
+          <a:lstStyle/>
+          <a:p>
+            <a:pPr algn="ctr"/>
+            <a:endParaRPr lang="en-US"/>
+          </a:p>
+        </p:txBody>
+      </p:sp>
+      <p:sp>
+        <p:nvSpPr>
+          <p:cNvPr id="22" name="TextBox 21">
+            <a:extLst>
+              <a:ext uri="{FF2B5EF4-FFF2-40B4-BE49-F238E27FC236}">
+                <a16:creationId xmlns:a16="http://schemas.microsoft.com/office/drawing/2014/main" id="{1B0490F4-5202-A949-A8C8-46249CE7F7D1}"/>
+              </a:ext>
+            </a:extLst>
+          </p:cNvPr>
+          <p:cNvSpPr txBox="1"/>
+          <p:nvPr/>
+        </p:nvSpPr>
+        <p:spPr>
+          <a:xfrm>
+            <a:off x="6696840" y="1360779"/>
+            <a:ext cx="661996" cy="338554"/>
+          </a:xfrm>
+          <a:prstGeom prst="rect">
+            <a:avLst/>
+          </a:prstGeom>
+          <a:noFill/>
+        </p:spPr>
+        <p:txBody>
+          <a:bodyPr wrap="square" rtlCol="0">
+            <a:spAutoFit/>
+          </a:bodyPr>
+          <a:lstStyle/>
+          <a:p>
+            <a:r>
+              <a:rPr lang="en-US" sz="1600" dirty="0"/>
+              <a:t>n = 1</a:t>
+            </a:r>
+          </a:p>
+        </p:txBody>
+      </p:sp>
+      <p:sp>
+        <p:nvSpPr>
+          <p:cNvPr id="23" name="Triangle 22">
+            <a:extLst>
+              <a:ext uri="{FF2B5EF4-FFF2-40B4-BE49-F238E27FC236}">
+                <a16:creationId xmlns:a16="http://schemas.microsoft.com/office/drawing/2014/main" id="{C3FB250A-79CF-1347-A07D-750CD1BA13D3}"/>
+              </a:ext>
+            </a:extLst>
+          </p:cNvPr>
+          <p:cNvSpPr/>
+          <p:nvPr/>
+        </p:nvSpPr>
+        <p:spPr>
+          <a:xfrm>
+            <a:off x="6507777" y="1442852"/>
+            <a:ext cx="202312" cy="174407"/>
+          </a:xfrm>
+          <a:prstGeom prst="triangle">
+            <a:avLst/>
+          </a:prstGeom>
+          <a:solidFill>
+            <a:schemeClr val="accent6">
+              <a:lumMod val="75000"/>
+            </a:schemeClr>
+          </a:solidFill>
+        </p:spPr>
+        <p:style>
+          <a:lnRef idx="2">
+            <a:schemeClr val="dk1"/>
+          </a:lnRef>
+          <a:fillRef idx="1">
+            <a:schemeClr val="lt1"/>
+          </a:fillRef>
+          <a:effectRef idx="0">
+            <a:schemeClr val="dk1"/>
+          </a:effectRef>
+          <a:fontRef idx="minor">
+            <a:schemeClr val="dk1"/>
+          </a:fontRef>
+        </p:style>
+        <p:txBody>
+          <a:bodyPr rtlCol="0" anchor="ctr"/>
+          <a:lstStyle/>
+          <a:p>
+            <a:pPr algn="ctr"/>
+            <a:endParaRPr lang="en-US"/>
+          </a:p>
+        </p:txBody>
+      </p:sp>
+      <p:sp>
+        <p:nvSpPr>
+          <p:cNvPr id="24" name="5-Point Star 23">
+            <a:extLst>
+              <a:ext uri="{FF2B5EF4-FFF2-40B4-BE49-F238E27FC236}">
+                <a16:creationId xmlns:a16="http://schemas.microsoft.com/office/drawing/2014/main" id="{D7D1B76C-ED40-0441-84E6-0960EA03F112}"/>
+              </a:ext>
+            </a:extLst>
+          </p:cNvPr>
+          <p:cNvSpPr/>
+          <p:nvPr/>
+        </p:nvSpPr>
+        <p:spPr>
+          <a:xfrm>
+            <a:off x="6064456" y="995942"/>
+            <a:ext cx="176750" cy="174407"/>
+          </a:xfrm>
+          <a:prstGeom prst="star5">
+            <a:avLst/>
+          </a:prstGeom>
+          <a:solidFill>
+            <a:schemeClr val="accent4"/>
+          </a:solidFill>
+          <a:ln>
+            <a:solidFill>
+              <a:schemeClr val="tx1"/>
+            </a:solidFill>
+          </a:ln>
+        </p:spPr>
+        <p:style>
+          <a:lnRef idx="2">
+            <a:schemeClr val="accent1">
+              <a:shade val="50000"/>
+            </a:schemeClr>
+          </a:lnRef>
+          <a:fillRef idx="1">
+            <a:schemeClr val="accent1"/>
+          </a:fillRef>
+          <a:effectRef idx="0">
+            <a:schemeClr val="accent1"/>
+          </a:effectRef>
+          <a:fontRef idx="minor">
+            <a:schemeClr val="lt1"/>
+          </a:fontRef>
+        </p:style>
+        <p:txBody>
+          <a:bodyPr rtlCol="0" anchor="ctr"/>
+          <a:lstStyle/>
+          <a:p>
+            <a:pPr algn="ctr"/>
+            <a:endParaRPr lang="en-US"/>
+          </a:p>
+        </p:txBody>
+      </p:sp>
+      <p:sp>
+        <p:nvSpPr>
+          <p:cNvPr id="25" name="TextBox 24">
+            <a:extLst>
+              <a:ext uri="{FF2B5EF4-FFF2-40B4-BE49-F238E27FC236}">
+                <a16:creationId xmlns:a16="http://schemas.microsoft.com/office/drawing/2014/main" id="{90B40985-A399-BA44-A8BB-E513AA2EFAF3}"/>
+              </a:ext>
+            </a:extLst>
+          </p:cNvPr>
+          <p:cNvSpPr txBox="1"/>
+          <p:nvPr/>
+        </p:nvSpPr>
+        <p:spPr>
+          <a:xfrm>
+            <a:off x="6244233" y="913868"/>
+            <a:ext cx="661996" cy="338554"/>
+          </a:xfrm>
+          <a:prstGeom prst="rect">
+            <a:avLst/>
+          </a:prstGeom>
+          <a:noFill/>
+        </p:spPr>
+        <p:txBody>
+          <a:bodyPr wrap="square" rtlCol="0">
+            <a:spAutoFit/>
+          </a:bodyPr>
+          <a:lstStyle/>
+          <a:p>
+            <a:r>
+              <a:rPr lang="en-US" sz="1600" dirty="0"/>
+              <a:t>n = 3</a:t>
+            </a:r>
+          </a:p>
+        </p:txBody>
+      </p:sp>
+      <p:sp>
+        <p:nvSpPr>
+          <p:cNvPr id="26" name="TextBox 25">
+            <a:extLst>
+              <a:ext uri="{FF2B5EF4-FFF2-40B4-BE49-F238E27FC236}">
+                <a16:creationId xmlns:a16="http://schemas.microsoft.com/office/drawing/2014/main" id="{7DF37A3F-924D-E049-BF68-EE0DFBA265B4}"/>
+              </a:ext>
+            </a:extLst>
+          </p:cNvPr>
+          <p:cNvSpPr txBox="1"/>
+          <p:nvPr/>
+        </p:nvSpPr>
+        <p:spPr>
+          <a:xfrm>
+            <a:off x="6096000" y="649781"/>
+            <a:ext cx="661996" cy="338554"/>
+          </a:xfrm>
+          <a:prstGeom prst="rect">
+            <a:avLst/>
+          </a:prstGeom>
+          <a:noFill/>
+        </p:spPr>
+        <p:txBody>
+          <a:bodyPr wrap="square" rtlCol="0">
+            <a:spAutoFit/>
+          </a:bodyPr>
+          <a:lstStyle/>
+          <a:p>
+            <a:r>
+              <a:rPr lang="en-US" sz="1600" dirty="0"/>
+              <a:t>n = 3</a:t>
+            </a:r>
+          </a:p>
+        </p:txBody>
+      </p:sp>
+      <p:sp>
+        <p:nvSpPr>
+          <p:cNvPr id="27" name="Triangle 26">
+            <a:extLst>
+              <a:ext uri="{FF2B5EF4-FFF2-40B4-BE49-F238E27FC236}">
+                <a16:creationId xmlns:a16="http://schemas.microsoft.com/office/drawing/2014/main" id="{68D8C16A-ED7C-D149-AA82-C6A08AA781E7}"/>
+              </a:ext>
+            </a:extLst>
+          </p:cNvPr>
+          <p:cNvSpPr/>
+          <p:nvPr/>
+        </p:nvSpPr>
+        <p:spPr>
+          <a:xfrm>
+            <a:off x="5906937" y="731854"/>
+            <a:ext cx="202312" cy="174407"/>
+          </a:xfrm>
+          <a:prstGeom prst="triangle">
+            <a:avLst/>
+          </a:prstGeom>
+          <a:solidFill>
+            <a:schemeClr val="accent6">
+              <a:lumMod val="75000"/>
+            </a:schemeClr>
+          </a:solidFill>
+        </p:spPr>
+        <p:style>
+          <a:lnRef idx="2">
+            <a:schemeClr val="dk1"/>
+          </a:lnRef>
+          <a:fillRef idx="1">
+            <a:schemeClr val="lt1"/>
+          </a:fillRef>
+          <a:effectRef idx="0">
+            <a:schemeClr val="dk1"/>
+          </a:effectRef>
+          <a:fontRef idx="minor">
+            <a:schemeClr val="dk1"/>
+          </a:fontRef>
+        </p:style>
+        <p:txBody>
+          <a:bodyPr rtlCol="0" anchor="ctr"/>
+          <a:lstStyle/>
+          <a:p>
+            <a:pPr algn="ctr"/>
+            <a:endParaRPr lang="en-US"/>
+          </a:p>
+        </p:txBody>
+      </p:sp>
       <p:grpSp>
         <p:nvGrpSpPr>
-          <p:cNvPr id="10" name="Group 9">
-            <a:extLst>
-              <a:ext uri="{FF2B5EF4-FFF2-40B4-BE49-F238E27FC236}">
-                <a16:creationId xmlns:a16="http://schemas.microsoft.com/office/drawing/2014/main" id="{04237416-DD00-8249-8326-5CEA25D2D72B}"/>
+          <p:cNvPr id="28" name="Group 27">
+            <a:extLst>
+              <a:ext uri="{FF2B5EF4-FFF2-40B4-BE49-F238E27FC236}">
+                <a16:creationId xmlns:a16="http://schemas.microsoft.com/office/drawing/2014/main" id="{6AD1F6C3-6FC9-FC41-B2E7-0069A7EBFDC5}"/>
               </a:ext>
             </a:extLst>
           </p:cNvPr>
@@ -3370,18 +4048,18 @@
         </p:nvGrpSpPr>
         <p:grpSpPr>
           <a:xfrm>
-            <a:off x="7899816" y="3059668"/>
-            <a:ext cx="2488368" cy="584775"/>
+            <a:off x="8170749" y="3059668"/>
+            <a:ext cx="2488368" cy="423193"/>
             <a:chOff x="8109678" y="2773181"/>
-            <a:chExt cx="2488368" cy="584775"/>
+            <a:chExt cx="2488368" cy="423193"/>
           </a:xfrm>
         </p:grpSpPr>
         <p:sp>
           <p:nvSpPr>
-            <p:cNvPr id="6" name="5-Point Star 5">
+            <p:cNvPr id="29" name="5-Point Star 28">
               <a:extLst>
                 <a:ext uri="{FF2B5EF4-FFF2-40B4-BE49-F238E27FC236}">
-                  <a16:creationId xmlns:a16="http://schemas.microsoft.com/office/drawing/2014/main" id="{E02B64D3-DE21-1243-81DF-483E76740A0C}"/>
+                  <a16:creationId xmlns:a16="http://schemas.microsoft.com/office/drawing/2014/main" id="{2DD0775A-A3F4-8043-8E2D-4947A10DA828}"/>
                 </a:ext>
               </a:extLst>
             </p:cNvPr>
@@ -3426,16 +4104,16 @@
             <a:lstStyle/>
             <a:p>
               <a:pPr algn="ctr"/>
-              <a:endParaRPr lang="en-US"/>
+              <a:endParaRPr lang="en-US" sz="1100"/>
             </a:p>
           </p:txBody>
         </p:sp>
         <p:sp>
           <p:nvSpPr>
-            <p:cNvPr id="7" name="TextBox 6">
+            <p:cNvPr id="30" name="TextBox 29">
               <a:extLst>
                 <a:ext uri="{FF2B5EF4-FFF2-40B4-BE49-F238E27FC236}">
-                  <a16:creationId xmlns:a16="http://schemas.microsoft.com/office/drawing/2014/main" id="{B82E99A5-19A5-C64B-8956-B591A545A4BD}"/>
+                  <a16:creationId xmlns:a16="http://schemas.microsoft.com/office/drawing/2014/main" id="{669C4B33-0A8C-A64D-A54A-03D7635B6E77}"/>
                 </a:ext>
               </a:extLst>
             </p:cNvPr>
@@ -3445,7 +4123,7 @@
           <p:spPr>
             <a:xfrm>
               <a:off x="8529403" y="2773181"/>
-              <a:ext cx="2068643" cy="584775"/>
+              <a:ext cx="2068643" cy="423193"/>
             </a:xfrm>
             <a:prstGeom prst="rect">
               <a:avLst/>
@@ -3459,241 +4137,30 @@
             <a:lstStyle/>
             <a:p>
               <a:r>
-                <a:rPr lang="en-US" dirty="0"/>
+                <a:rPr lang="en-US" sz="1100" dirty="0"/>
                 <a:t>Bd-inhibitive </a:t>
               </a:r>
               <a:r>
-                <a:rPr lang="en-US" i="1" dirty="0"/>
+                <a:rPr lang="en-US" sz="1100" i="1" dirty="0"/>
                 <a:t>in vitro </a:t>
               </a:r>
+            </a:p>
+            <a:p>
               <a:r>
-                <a:rPr lang="en-US" sz="1400" dirty="0"/>
+                <a:rPr lang="en-US" sz="1000" dirty="0"/>
                 <a:t>(n = number of isolates)</a:t>
               </a:r>
-              <a:endParaRPr lang="en-US" dirty="0"/>
+              <a:endParaRPr lang="en-US" sz="1100" dirty="0"/>
             </a:p>
           </p:txBody>
         </p:sp>
       </p:grpSp>
-      <p:sp>
-        <p:nvSpPr>
-          <p:cNvPr id="11" name="5-Point Star 10">
-            <a:extLst>
-              <a:ext uri="{FF2B5EF4-FFF2-40B4-BE49-F238E27FC236}">
-                <a16:creationId xmlns:a16="http://schemas.microsoft.com/office/drawing/2014/main" id="{908F1F05-C1A2-A540-8680-ACBBF22A4ECA}"/>
-              </a:ext>
-            </a:extLst>
-          </p:cNvPr>
-          <p:cNvSpPr/>
-          <p:nvPr/>
-        </p:nvSpPr>
-        <p:spPr>
-          <a:xfrm>
-            <a:off x="6719147" y="1333038"/>
-            <a:ext cx="176750" cy="174407"/>
-          </a:xfrm>
-          <a:prstGeom prst="star5">
-            <a:avLst/>
-          </a:prstGeom>
-          <a:solidFill>
-            <a:schemeClr val="accent4"/>
-          </a:solidFill>
-          <a:ln>
-            <a:solidFill>
-              <a:schemeClr val="tx1"/>
-            </a:solidFill>
-          </a:ln>
-        </p:spPr>
-        <p:style>
-          <a:lnRef idx="2">
-            <a:schemeClr val="accent1">
-              <a:shade val="50000"/>
-            </a:schemeClr>
-          </a:lnRef>
-          <a:fillRef idx="1">
-            <a:schemeClr val="accent1"/>
-          </a:fillRef>
-          <a:effectRef idx="0">
-            <a:schemeClr val="accent1"/>
-          </a:effectRef>
-          <a:fontRef idx="minor">
-            <a:schemeClr val="lt1"/>
-          </a:fontRef>
-        </p:style>
-        <p:txBody>
-          <a:bodyPr rtlCol="0" anchor="ctr"/>
-          <a:lstStyle/>
-          <a:p>
-            <a:pPr algn="ctr"/>
-            <a:endParaRPr lang="en-US"/>
-          </a:p>
-        </p:txBody>
-      </p:sp>
-      <p:sp>
-        <p:nvSpPr>
-          <p:cNvPr id="13" name="5-Point Star 12">
-            <a:extLst>
-              <a:ext uri="{FF2B5EF4-FFF2-40B4-BE49-F238E27FC236}">
-                <a16:creationId xmlns:a16="http://schemas.microsoft.com/office/drawing/2014/main" id="{6FF1C149-5FCA-044F-89BE-79D67EA55F80}"/>
-              </a:ext>
-            </a:extLst>
-          </p:cNvPr>
-          <p:cNvSpPr/>
-          <p:nvPr/>
-        </p:nvSpPr>
-        <p:spPr>
-          <a:xfrm>
-            <a:off x="1827059" y="915612"/>
-            <a:ext cx="176750" cy="174407"/>
-          </a:xfrm>
-          <a:prstGeom prst="star5">
-            <a:avLst/>
-          </a:prstGeom>
-          <a:solidFill>
-            <a:schemeClr val="accent4"/>
-          </a:solidFill>
-          <a:ln>
-            <a:solidFill>
-              <a:schemeClr val="tx1"/>
-            </a:solidFill>
-          </a:ln>
-        </p:spPr>
-        <p:style>
-          <a:lnRef idx="2">
-            <a:schemeClr val="accent1">
-              <a:shade val="50000"/>
-            </a:schemeClr>
-          </a:lnRef>
-          <a:fillRef idx="1">
-            <a:schemeClr val="accent1"/>
-          </a:fillRef>
-          <a:effectRef idx="0">
-            <a:schemeClr val="accent1"/>
-          </a:effectRef>
-          <a:fontRef idx="minor">
-            <a:schemeClr val="lt1"/>
-          </a:fontRef>
-        </p:style>
-        <p:txBody>
-          <a:bodyPr rtlCol="0" anchor="ctr"/>
-          <a:lstStyle/>
-          <a:p>
-            <a:pPr algn="ctr"/>
-            <a:endParaRPr lang="en-US"/>
-          </a:p>
-        </p:txBody>
-      </p:sp>
-      <p:sp>
-        <p:nvSpPr>
-          <p:cNvPr id="14" name="TextBox 13">
-            <a:extLst>
-              <a:ext uri="{FF2B5EF4-FFF2-40B4-BE49-F238E27FC236}">
-                <a16:creationId xmlns:a16="http://schemas.microsoft.com/office/drawing/2014/main" id="{662D68F1-37A7-2A44-B91D-61D7187855C1}"/>
-              </a:ext>
-            </a:extLst>
-          </p:cNvPr>
-          <p:cNvSpPr txBox="1"/>
-          <p:nvPr/>
-        </p:nvSpPr>
-        <p:spPr>
-          <a:xfrm>
-            <a:off x="1993446" y="833538"/>
-            <a:ext cx="661996" cy="338554"/>
-          </a:xfrm>
-          <a:prstGeom prst="rect">
-            <a:avLst/>
-          </a:prstGeom>
-          <a:noFill/>
-        </p:spPr>
-        <p:txBody>
-          <a:bodyPr wrap="square" rtlCol="0">
-            <a:spAutoFit/>
-          </a:bodyPr>
-          <a:lstStyle/>
-          <a:p>
-            <a:r>
-              <a:rPr lang="en-US" sz="1600" dirty="0"/>
-              <a:t>n = 2</a:t>
-            </a:r>
-          </a:p>
-        </p:txBody>
-      </p:sp>
-      <p:sp>
-        <p:nvSpPr>
-          <p:cNvPr id="15" name="TextBox 14">
-            <a:extLst>
-              <a:ext uri="{FF2B5EF4-FFF2-40B4-BE49-F238E27FC236}">
-                <a16:creationId xmlns:a16="http://schemas.microsoft.com/office/drawing/2014/main" id="{461ED095-A45D-1143-924C-022A95B9E05E}"/>
-              </a:ext>
-            </a:extLst>
-          </p:cNvPr>
-          <p:cNvSpPr txBox="1"/>
-          <p:nvPr/>
-        </p:nvSpPr>
-        <p:spPr>
-          <a:xfrm>
-            <a:off x="2003809" y="5698787"/>
-            <a:ext cx="661996" cy="338554"/>
-          </a:xfrm>
-          <a:prstGeom prst="rect">
-            <a:avLst/>
-          </a:prstGeom>
-          <a:noFill/>
-        </p:spPr>
-        <p:txBody>
-          <a:bodyPr wrap="square" rtlCol="0">
-            <a:spAutoFit/>
-          </a:bodyPr>
-          <a:lstStyle/>
-          <a:p>
-            <a:r>
-              <a:rPr lang="en-US" sz="1600" dirty="0"/>
-              <a:t>n = 5</a:t>
-            </a:r>
-          </a:p>
-        </p:txBody>
-      </p:sp>
-      <p:sp>
-        <p:nvSpPr>
-          <p:cNvPr id="16" name="TextBox 15">
-            <a:extLst>
-              <a:ext uri="{FF2B5EF4-FFF2-40B4-BE49-F238E27FC236}">
-                <a16:creationId xmlns:a16="http://schemas.microsoft.com/office/drawing/2014/main" id="{33EE62C2-9C00-EA47-A569-2AC3866C0F48}"/>
-              </a:ext>
-            </a:extLst>
-          </p:cNvPr>
-          <p:cNvSpPr txBox="1"/>
-          <p:nvPr/>
-        </p:nvSpPr>
-        <p:spPr>
-          <a:xfrm>
-            <a:off x="6898924" y="1250964"/>
-            <a:ext cx="661996" cy="338554"/>
-          </a:xfrm>
-          <a:prstGeom prst="rect">
-            <a:avLst/>
-          </a:prstGeom>
-          <a:noFill/>
-        </p:spPr>
-        <p:txBody>
-          <a:bodyPr wrap="square" rtlCol="0">
-            <a:spAutoFit/>
-          </a:bodyPr>
-          <a:lstStyle/>
-          <a:p>
-            <a:r>
-              <a:rPr lang="en-US" sz="1600" dirty="0"/>
-              <a:t>n = 3</a:t>
-            </a:r>
-          </a:p>
-        </p:txBody>
-      </p:sp>
       <p:grpSp>
         <p:nvGrpSpPr>
-          <p:cNvPr id="3" name="Group 2">
-            <a:extLst>
-              <a:ext uri="{FF2B5EF4-FFF2-40B4-BE49-F238E27FC236}">
-                <a16:creationId xmlns:a16="http://schemas.microsoft.com/office/drawing/2014/main" id="{41F043AA-3D19-5749-AB21-5C6EACCA5377}"/>
+          <p:cNvPr id="31" name="Group 30">
+            <a:extLst>
+              <a:ext uri="{FF2B5EF4-FFF2-40B4-BE49-F238E27FC236}">
+                <a16:creationId xmlns:a16="http://schemas.microsoft.com/office/drawing/2014/main" id="{233CA8BF-04A3-0042-A22F-506D9F08CA6C}"/>
               </a:ext>
             </a:extLst>
           </p:cNvPr>
@@ -3702,18 +4169,18 @@
         </p:nvGrpSpPr>
         <p:grpSpPr>
           <a:xfrm>
-            <a:off x="7899816" y="2458307"/>
-            <a:ext cx="3537679" cy="584775"/>
-            <a:chOff x="7629993" y="2458307"/>
-            <a:chExt cx="3537679" cy="584775"/>
+            <a:off x="8170749" y="2518267"/>
+            <a:ext cx="3537679" cy="423193"/>
+            <a:chOff x="7629993" y="2518267"/>
+            <a:chExt cx="3537679" cy="423193"/>
           </a:xfrm>
         </p:grpSpPr>
         <p:sp>
           <p:nvSpPr>
-            <p:cNvPr id="2" name="Triangle 1">
+            <p:cNvPr id="32" name="Triangle 31">
               <a:extLst>
                 <a:ext uri="{FF2B5EF4-FFF2-40B4-BE49-F238E27FC236}">
-                  <a16:creationId xmlns:a16="http://schemas.microsoft.com/office/drawing/2014/main" id="{B6EEB4B1-2FF9-C849-A758-75E718D1DD52}"/>
+                  <a16:creationId xmlns:a16="http://schemas.microsoft.com/office/drawing/2014/main" id="{6C417EF3-C4D0-7D4B-976B-A180A9C72D69}"/>
                 </a:ext>
               </a:extLst>
             </p:cNvPr>
@@ -3753,16 +4220,16 @@
             <a:lstStyle/>
             <a:p>
               <a:pPr algn="ctr"/>
-              <a:endParaRPr lang="en-US"/>
+              <a:endParaRPr lang="en-US" sz="1100"/>
             </a:p>
           </p:txBody>
         </p:sp>
         <p:sp>
           <p:nvSpPr>
-            <p:cNvPr id="17" name="TextBox 16">
+            <p:cNvPr id="33" name="TextBox 32">
               <a:extLst>
                 <a:ext uri="{FF2B5EF4-FFF2-40B4-BE49-F238E27FC236}">
-                  <a16:creationId xmlns:a16="http://schemas.microsoft.com/office/drawing/2014/main" id="{F6405FCD-9731-FC44-B5A9-2BBA1D07D92D}"/>
+                  <a16:creationId xmlns:a16="http://schemas.microsoft.com/office/drawing/2014/main" id="{69015968-9464-8746-8411-B60B5AE5A88C}"/>
                 </a:ext>
               </a:extLst>
             </p:cNvPr>
@@ -3771,8 +4238,8 @@
           </p:nvSpPr>
           <p:spPr>
             <a:xfrm>
-              <a:off x="8049717" y="2458307"/>
-              <a:ext cx="3117955" cy="584775"/>
+              <a:off x="8049717" y="2518267"/>
+              <a:ext cx="3117955" cy="423193"/>
             </a:xfrm>
             <a:prstGeom prst="rect">
               <a:avLst/>
@@ -3786,28 +4253,30 @@
             <a:lstStyle/>
             <a:p>
               <a:r>
-                <a:rPr lang="en-US" dirty="0"/>
+                <a:rPr lang="en-US" sz="1100" dirty="0"/>
                 <a:t>Tested for Bd inhibition </a:t>
               </a:r>
               <a:r>
-                <a:rPr lang="en-US" i="1" dirty="0"/>
+                <a:rPr lang="en-US" sz="1100" i="1" dirty="0"/>
                 <a:t>in vitro </a:t>
               </a:r>
+            </a:p>
+            <a:p>
               <a:r>
-                <a:rPr lang="en-US" sz="1400" dirty="0"/>
+                <a:rPr lang="en-US" sz="1000" dirty="0"/>
                 <a:t>(n = number of isolates)</a:t>
               </a:r>
-              <a:endParaRPr lang="en-US" dirty="0"/>
+              <a:endParaRPr lang="en-US" sz="1100" dirty="0"/>
             </a:p>
           </p:txBody>
         </p:sp>
       </p:grpSp>
       <p:sp>
         <p:nvSpPr>
-          <p:cNvPr id="19" name="Triangle 18">
-            <a:extLst>
-              <a:ext uri="{FF2B5EF4-FFF2-40B4-BE49-F238E27FC236}">
-                <a16:creationId xmlns:a16="http://schemas.microsoft.com/office/drawing/2014/main" id="{96AC43E4-EE75-D742-BDDD-5827A9E35E75}"/>
+          <p:cNvPr id="34" name="5-Point Star 33">
+            <a:extLst>
+              <a:ext uri="{FF2B5EF4-FFF2-40B4-BE49-F238E27FC236}">
+                <a16:creationId xmlns:a16="http://schemas.microsoft.com/office/drawing/2014/main" id="{A8A354DE-D173-2246-9C8B-7B89FDA6764C}"/>
               </a:ext>
             </a:extLst>
           </p:cNvPr>
@@ -3816,7 +4285,131 @@
         </p:nvSpPr>
         <p:spPr>
           <a:xfrm>
-            <a:off x="1814746" y="5780860"/>
+            <a:off x="5063137" y="469643"/>
+            <a:ext cx="176750" cy="174407"/>
+          </a:xfrm>
+          <a:prstGeom prst="star5">
+            <a:avLst/>
+          </a:prstGeom>
+          <a:solidFill>
+            <a:schemeClr val="accent4"/>
+          </a:solidFill>
+          <a:ln>
+            <a:solidFill>
+              <a:schemeClr val="tx1"/>
+            </a:solidFill>
+          </a:ln>
+        </p:spPr>
+        <p:style>
+          <a:lnRef idx="2">
+            <a:schemeClr val="accent1">
+              <a:shade val="50000"/>
+            </a:schemeClr>
+          </a:lnRef>
+          <a:fillRef idx="1">
+            <a:schemeClr val="accent1"/>
+          </a:fillRef>
+          <a:effectRef idx="0">
+            <a:schemeClr val="accent1"/>
+          </a:effectRef>
+          <a:fontRef idx="minor">
+            <a:schemeClr val="lt1"/>
+          </a:fontRef>
+        </p:style>
+        <p:txBody>
+          <a:bodyPr rtlCol="0" anchor="ctr"/>
+          <a:lstStyle/>
+          <a:p>
+            <a:pPr algn="ctr"/>
+            <a:endParaRPr lang="en-US"/>
+          </a:p>
+        </p:txBody>
+      </p:sp>
+      <p:sp>
+        <p:nvSpPr>
+          <p:cNvPr id="35" name="TextBox 34">
+            <a:extLst>
+              <a:ext uri="{FF2B5EF4-FFF2-40B4-BE49-F238E27FC236}">
+                <a16:creationId xmlns:a16="http://schemas.microsoft.com/office/drawing/2014/main" id="{D548FC67-A2BC-2A4C-9F16-694A5EA24997}"/>
+              </a:ext>
+            </a:extLst>
+          </p:cNvPr>
+          <p:cNvSpPr txBox="1"/>
+          <p:nvPr/>
+        </p:nvSpPr>
+        <p:spPr>
+          <a:xfrm>
+            <a:off x="5229524" y="387569"/>
+            <a:ext cx="661996" cy="338554"/>
+          </a:xfrm>
+          <a:prstGeom prst="rect">
+            <a:avLst/>
+          </a:prstGeom>
+          <a:noFill/>
+        </p:spPr>
+        <p:txBody>
+          <a:bodyPr wrap="square" rtlCol="0">
+            <a:spAutoFit/>
+          </a:bodyPr>
+          <a:lstStyle/>
+          <a:p>
+            <a:r>
+              <a:rPr lang="en-US" sz="1600" dirty="0"/>
+              <a:t>n = 2</a:t>
+            </a:r>
+          </a:p>
+        </p:txBody>
+      </p:sp>
+      <p:sp>
+        <p:nvSpPr>
+          <p:cNvPr id="36" name="TextBox 35">
+            <a:extLst>
+              <a:ext uri="{FF2B5EF4-FFF2-40B4-BE49-F238E27FC236}">
+                <a16:creationId xmlns:a16="http://schemas.microsoft.com/office/drawing/2014/main" id="{89F8C939-6D7F-9C4F-9E75-7371872C8E62}"/>
+              </a:ext>
+            </a:extLst>
+          </p:cNvPr>
+          <p:cNvSpPr txBox="1"/>
+          <p:nvPr/>
+        </p:nvSpPr>
+        <p:spPr>
+          <a:xfrm>
+            <a:off x="5138292" y="113690"/>
+            <a:ext cx="661996" cy="338554"/>
+          </a:xfrm>
+          <a:prstGeom prst="rect">
+            <a:avLst/>
+          </a:prstGeom>
+          <a:noFill/>
+        </p:spPr>
+        <p:txBody>
+          <a:bodyPr wrap="square" rtlCol="0">
+            <a:spAutoFit/>
+          </a:bodyPr>
+          <a:lstStyle/>
+          <a:p>
+            <a:r>
+              <a:rPr lang="en-US" sz="1600" dirty="0"/>
+              <a:t>n = 2</a:t>
+            </a:r>
+          </a:p>
+        </p:txBody>
+      </p:sp>
+      <p:sp>
+        <p:nvSpPr>
+          <p:cNvPr id="37" name="Triangle 36">
+            <a:extLst>
+              <a:ext uri="{FF2B5EF4-FFF2-40B4-BE49-F238E27FC236}">
+                <a16:creationId xmlns:a16="http://schemas.microsoft.com/office/drawing/2014/main" id="{E26B5D5E-0EFD-594B-978C-52A9513C6443}"/>
+              </a:ext>
+            </a:extLst>
+          </p:cNvPr>
+          <p:cNvSpPr/>
+          <p:nvPr/>
+        </p:nvSpPr>
+        <p:spPr>
+          <a:xfrm>
+            <a:off x="4949229" y="195763"/>
             <a:ext cx="202312" cy="174407"/>
           </a:xfrm>
           <a:prstGeom prst="triangle">
@@ -3851,79 +4444,109 @@
           </a:p>
         </p:txBody>
       </p:sp>
-      <p:sp>
-        <p:nvSpPr>
-          <p:cNvPr id="20" name="TextBox 19">
-            <a:extLst>
-              <a:ext uri="{FF2B5EF4-FFF2-40B4-BE49-F238E27FC236}">
-                <a16:creationId xmlns:a16="http://schemas.microsoft.com/office/drawing/2014/main" id="{1E327411-C58D-EA41-8610-83F7A5C3548B}"/>
-              </a:ext>
-            </a:extLst>
-          </p:cNvPr>
-          <p:cNvSpPr txBox="1"/>
+    </p:spTree>
+    <p:extLst>
+      <p:ext uri="{BB962C8B-B14F-4D97-AF65-F5344CB8AC3E}">
+        <p14:creationId xmlns:p14="http://schemas.microsoft.com/office/powerpoint/2010/main" val="3970298769"/>
+      </p:ext>
+    </p:extLst>
+  </p:cSld>
+  <p:clrMapOvr>
+    <a:masterClrMapping/>
+  </p:clrMapOvr>
+</p:sld>
+</file>
+
+<file path=ppt/slides/slide2.xml><?xml version="1.0" encoding="utf-8"?>
+<p:sld xmlns:a="http://schemas.openxmlformats.org/drawingml/2006/main" xmlns:r="http://schemas.openxmlformats.org/officeDocument/2006/relationships" xmlns:p="http://schemas.openxmlformats.org/presentationml/2006/main">
+  <p:cSld>
+    <p:spTree>
+      <p:nvGrpSpPr>
+        <p:cNvPr id="1" name=""/>
+        <p:cNvGrpSpPr/>
+        <p:nvPr/>
+      </p:nvGrpSpPr>
+      <p:grpSpPr>
+        <a:xfrm>
+          <a:off x="0" y="0"/>
+          <a:ext cx="0" cy="0"/>
+          <a:chOff x="0" y="0"/>
+          <a:chExt cx="0" cy="0"/>
+        </a:xfrm>
+      </p:grpSpPr>
+      <p:pic>
+        <p:nvPicPr>
+          <p:cNvPr id="9" name="Picture 8">
+            <a:extLst>
+              <a:ext uri="{FF2B5EF4-FFF2-40B4-BE49-F238E27FC236}">
+                <a16:creationId xmlns:a16="http://schemas.microsoft.com/office/drawing/2014/main" id="{8705D9F6-853F-974B-8BB3-9CC871B08FC0}"/>
+              </a:ext>
+            </a:extLst>
+          </p:cNvPr>
+          <p:cNvPicPr>
+            <a:picLocks noChangeAspect="1"/>
+          </p:cNvPicPr>
           <p:nvPr/>
-        </p:nvSpPr>
+        </p:nvPicPr>
+        <p:blipFill>
+          <a:blip r:embed="rId2"/>
+          <a:stretch>
+            <a:fillRect/>
+          </a:stretch>
+        </p:blipFill>
         <p:spPr>
           <a:xfrm>
-            <a:off x="2156209" y="559659"/>
-            <a:ext cx="661996" cy="338554"/>
+            <a:off x="0" y="146538"/>
+            <a:ext cx="12192000" cy="6564923"/>
+          </a:xfrm>
+          <a:prstGeom prst="rect">
+            <a:avLst/>
+          </a:prstGeom>
+        </p:spPr>
+      </p:pic>
+      <p:sp>
+        <p:nvSpPr>
+          <p:cNvPr id="10" name="Rectangle 9">
+            <a:extLst>
+              <a:ext uri="{FF2B5EF4-FFF2-40B4-BE49-F238E27FC236}">
+                <a16:creationId xmlns:a16="http://schemas.microsoft.com/office/drawing/2014/main" id="{FAAE9A47-BA40-6448-B4FA-02562682D732}"/>
+              </a:ext>
+            </a:extLst>
+          </p:cNvPr>
+          <p:cNvSpPr/>
+          <p:nvPr/>
+        </p:nvSpPr>
+        <p:spPr>
+          <a:xfrm>
+            <a:off x="8064708" y="1834352"/>
+            <a:ext cx="1993692" cy="1554480"/>
           </a:xfrm>
           <a:prstGeom prst="rect">
             <a:avLst/>
           </a:prstGeom>
           <a:noFill/>
-        </p:spPr>
-        <p:txBody>
-          <a:bodyPr wrap="square" rtlCol="0">
-            <a:spAutoFit/>
-          </a:bodyPr>
-          <a:lstStyle/>
-          <a:p>
-            <a:r>
-              <a:rPr lang="en-US" sz="1600" dirty="0"/>
-              <a:t>n = 3</a:t>
-            </a:r>
-          </a:p>
-        </p:txBody>
-      </p:sp>
-      <p:sp>
-        <p:nvSpPr>
-          <p:cNvPr id="21" name="Triangle 20">
-            <a:extLst>
-              <a:ext uri="{FF2B5EF4-FFF2-40B4-BE49-F238E27FC236}">
-                <a16:creationId xmlns:a16="http://schemas.microsoft.com/office/drawing/2014/main" id="{EA65796E-2403-964E-970E-C76196259D88}"/>
-              </a:ext>
-            </a:extLst>
-          </p:cNvPr>
-          <p:cNvSpPr/>
-          <p:nvPr/>
-        </p:nvSpPr>
-        <p:spPr>
-          <a:xfrm>
-            <a:off x="1967146" y="641732"/>
-            <a:ext cx="202312" cy="174407"/>
-          </a:xfrm>
-          <a:prstGeom prst="triangle">
-            <a:avLst/>
-          </a:prstGeom>
-          <a:solidFill>
-            <a:schemeClr val="accent6">
-              <a:lumMod val="75000"/>
-            </a:schemeClr>
-          </a:solidFill>
+          <a:ln w="38100">
+            <a:solidFill>
+              <a:schemeClr val="accent5">
+                <a:lumMod val="75000"/>
+              </a:schemeClr>
+            </a:solidFill>
+          </a:ln>
         </p:spPr>
         <p:style>
           <a:lnRef idx="2">
-            <a:schemeClr val="dk1"/>
+            <a:schemeClr val="accent1">
+              <a:shade val="50000"/>
+            </a:schemeClr>
           </a:lnRef>
           <a:fillRef idx="1">
-            <a:schemeClr val="lt1"/>
+            <a:schemeClr val="accent1"/>
           </a:fillRef>
           <a:effectRef idx="0">
-            <a:schemeClr val="dk1"/>
+            <a:schemeClr val="accent1"/>
           </a:effectRef>
           <a:fontRef idx="minor">
-            <a:schemeClr val="dk1"/>
+            <a:schemeClr val="lt1"/>
           </a:fontRef>
         </p:style>
         <p:txBody>
@@ -3937,413 +4560,47 @@
       </p:sp>
       <p:sp>
         <p:nvSpPr>
-          <p:cNvPr id="22" name="TextBox 21">
-            <a:extLst>
-              <a:ext uri="{FF2B5EF4-FFF2-40B4-BE49-F238E27FC236}">
-                <a16:creationId xmlns:a16="http://schemas.microsoft.com/office/drawing/2014/main" id="{E5BE7999-C4E4-0B43-9295-CB35D7019457}"/>
-              </a:ext>
-            </a:extLst>
-          </p:cNvPr>
-          <p:cNvSpPr txBox="1"/>
+          <p:cNvPr id="11" name="Rectangle 10">
+            <a:extLst>
+              <a:ext uri="{FF2B5EF4-FFF2-40B4-BE49-F238E27FC236}">
+                <a16:creationId xmlns:a16="http://schemas.microsoft.com/office/drawing/2014/main" id="{7C7CB686-B1C9-494B-AC26-2669E49C5C98}"/>
+              </a:ext>
+            </a:extLst>
+          </p:cNvPr>
+          <p:cNvSpPr/>
           <p:nvPr/>
         </p:nvSpPr>
         <p:spPr>
           <a:xfrm>
-            <a:off x="3822613" y="37504"/>
-            <a:ext cx="661996" cy="338554"/>
+            <a:off x="5592441" y="3451484"/>
+            <a:ext cx="1993692" cy="1554480"/>
           </a:xfrm>
           <a:prstGeom prst="rect">
             <a:avLst/>
           </a:prstGeom>
           <a:noFill/>
-        </p:spPr>
-        <p:txBody>
-          <a:bodyPr wrap="square" rtlCol="0">
-            <a:spAutoFit/>
-          </a:bodyPr>
-          <a:lstStyle/>
-          <a:p>
-            <a:r>
-              <a:rPr lang="en-US" sz="1600" dirty="0"/>
-              <a:t>n = 1</a:t>
-            </a:r>
-          </a:p>
-        </p:txBody>
-      </p:sp>
-      <p:sp>
-        <p:nvSpPr>
-          <p:cNvPr id="23" name="Triangle 22">
-            <a:extLst>
-              <a:ext uri="{FF2B5EF4-FFF2-40B4-BE49-F238E27FC236}">
-                <a16:creationId xmlns:a16="http://schemas.microsoft.com/office/drawing/2014/main" id="{454E14EC-93E1-8B4F-8D12-C08B0E4217F8}"/>
-              </a:ext>
-            </a:extLst>
-          </p:cNvPr>
-          <p:cNvSpPr/>
-          <p:nvPr/>
-        </p:nvSpPr>
-        <p:spPr>
-          <a:xfrm>
-            <a:off x="3633550" y="119577"/>
-            <a:ext cx="202312" cy="174407"/>
-          </a:xfrm>
-          <a:prstGeom prst="triangle">
-            <a:avLst/>
-          </a:prstGeom>
-          <a:solidFill>
-            <a:schemeClr val="accent6">
-              <a:lumMod val="75000"/>
-            </a:schemeClr>
-          </a:solidFill>
+          <a:ln w="38100">
+            <a:solidFill>
+              <a:schemeClr val="accent5">
+                <a:lumMod val="75000"/>
+              </a:schemeClr>
+            </a:solidFill>
+          </a:ln>
         </p:spPr>
         <p:style>
           <a:lnRef idx="2">
-            <a:schemeClr val="dk1"/>
+            <a:schemeClr val="accent1">
+              <a:shade val="50000"/>
+            </a:schemeClr>
           </a:lnRef>
           <a:fillRef idx="1">
-            <a:schemeClr val="lt1"/>
+            <a:schemeClr val="accent1"/>
           </a:fillRef>
           <a:effectRef idx="0">
-            <a:schemeClr val="dk1"/>
+            <a:schemeClr val="accent1"/>
           </a:effectRef>
           <a:fontRef idx="minor">
-            <a:schemeClr val="dk1"/>
-          </a:fontRef>
-        </p:style>
-        <p:txBody>
-          <a:bodyPr rtlCol="0" anchor="ctr"/>
-          <a:lstStyle/>
-          <a:p>
-            <a:pPr algn="ctr"/>
-            <a:endParaRPr lang="en-US"/>
-          </a:p>
-        </p:txBody>
-      </p:sp>
-      <p:sp>
-        <p:nvSpPr>
-          <p:cNvPr id="24" name="TextBox 23">
-            <a:extLst>
-              <a:ext uri="{FF2B5EF4-FFF2-40B4-BE49-F238E27FC236}">
-                <a16:creationId xmlns:a16="http://schemas.microsoft.com/office/drawing/2014/main" id="{5C056743-4BF2-4A44-88FF-4FB13C320979}"/>
-              </a:ext>
-            </a:extLst>
-          </p:cNvPr>
-          <p:cNvSpPr txBox="1"/>
-          <p:nvPr/>
-        </p:nvSpPr>
-        <p:spPr>
-          <a:xfrm>
-            <a:off x="5968706" y="564657"/>
-            <a:ext cx="661996" cy="338554"/>
-          </a:xfrm>
-          <a:prstGeom prst="rect">
-            <a:avLst/>
-          </a:prstGeom>
-          <a:noFill/>
-        </p:spPr>
-        <p:txBody>
-          <a:bodyPr wrap="square" rtlCol="0">
-            <a:spAutoFit/>
-          </a:bodyPr>
-          <a:lstStyle/>
-          <a:p>
-            <a:r>
-              <a:rPr lang="en-US" sz="1600" dirty="0"/>
-              <a:t>n = 1</a:t>
-            </a:r>
-          </a:p>
-        </p:txBody>
-      </p:sp>
-      <p:sp>
-        <p:nvSpPr>
-          <p:cNvPr id="25" name="Triangle 24">
-            <a:extLst>
-              <a:ext uri="{FF2B5EF4-FFF2-40B4-BE49-F238E27FC236}">
-                <a16:creationId xmlns:a16="http://schemas.microsoft.com/office/drawing/2014/main" id="{9FB7F1CE-4BBD-9645-A2CA-79D77DDD7C50}"/>
-              </a:ext>
-            </a:extLst>
-          </p:cNvPr>
-          <p:cNvSpPr/>
-          <p:nvPr/>
-        </p:nvSpPr>
-        <p:spPr>
-          <a:xfrm>
-            <a:off x="5779643" y="646730"/>
-            <a:ext cx="202312" cy="174407"/>
-          </a:xfrm>
-          <a:prstGeom prst="triangle">
-            <a:avLst/>
-          </a:prstGeom>
-          <a:solidFill>
-            <a:schemeClr val="accent6">
-              <a:lumMod val="75000"/>
-            </a:schemeClr>
-          </a:solidFill>
-        </p:spPr>
-        <p:style>
-          <a:lnRef idx="2">
-            <a:schemeClr val="dk1"/>
-          </a:lnRef>
-          <a:fillRef idx="1">
             <a:schemeClr val="lt1"/>
-          </a:fillRef>
-          <a:effectRef idx="0">
-            <a:schemeClr val="dk1"/>
-          </a:effectRef>
-          <a:fontRef idx="minor">
-            <a:schemeClr val="dk1"/>
-          </a:fontRef>
-        </p:style>
-        <p:txBody>
-          <a:bodyPr rtlCol="0" anchor="ctr"/>
-          <a:lstStyle/>
-          <a:p>
-            <a:pPr algn="ctr"/>
-            <a:endParaRPr lang="en-US"/>
-          </a:p>
-        </p:txBody>
-      </p:sp>
-      <p:sp>
-        <p:nvSpPr>
-          <p:cNvPr id="26" name="TextBox 25">
-            <a:extLst>
-              <a:ext uri="{FF2B5EF4-FFF2-40B4-BE49-F238E27FC236}">
-                <a16:creationId xmlns:a16="http://schemas.microsoft.com/office/drawing/2014/main" id="{40C43FAD-DD7C-1048-910D-63DE046897E8}"/>
-              </a:ext>
-            </a:extLst>
-          </p:cNvPr>
-          <p:cNvSpPr txBox="1"/>
-          <p:nvPr/>
-        </p:nvSpPr>
-        <p:spPr>
-          <a:xfrm>
-            <a:off x="6750691" y="986877"/>
-            <a:ext cx="661996" cy="338554"/>
-          </a:xfrm>
-          <a:prstGeom prst="rect">
-            <a:avLst/>
-          </a:prstGeom>
-          <a:noFill/>
-        </p:spPr>
-        <p:txBody>
-          <a:bodyPr wrap="square" rtlCol="0">
-            <a:spAutoFit/>
-          </a:bodyPr>
-          <a:lstStyle/>
-          <a:p>
-            <a:r>
-              <a:rPr lang="en-US" sz="1600" dirty="0"/>
-              <a:t>n = 3</a:t>
-            </a:r>
-          </a:p>
-        </p:txBody>
-      </p:sp>
-      <p:sp>
-        <p:nvSpPr>
-          <p:cNvPr id="27" name="Triangle 26">
-            <a:extLst>
-              <a:ext uri="{FF2B5EF4-FFF2-40B4-BE49-F238E27FC236}">
-                <a16:creationId xmlns:a16="http://schemas.microsoft.com/office/drawing/2014/main" id="{9E940E47-4C46-3448-B15C-1390E01E50D7}"/>
-              </a:ext>
-            </a:extLst>
-          </p:cNvPr>
-          <p:cNvSpPr/>
-          <p:nvPr/>
-        </p:nvSpPr>
-        <p:spPr>
-          <a:xfrm>
-            <a:off x="6561628" y="1068950"/>
-            <a:ext cx="202312" cy="174407"/>
-          </a:xfrm>
-          <a:prstGeom prst="triangle">
-            <a:avLst/>
-          </a:prstGeom>
-          <a:solidFill>
-            <a:schemeClr val="accent6">
-              <a:lumMod val="75000"/>
-            </a:schemeClr>
-          </a:solidFill>
-        </p:spPr>
-        <p:style>
-          <a:lnRef idx="2">
-            <a:schemeClr val="dk1"/>
-          </a:lnRef>
-          <a:fillRef idx="1">
-            <a:schemeClr val="lt1"/>
-          </a:fillRef>
-          <a:effectRef idx="0">
-            <a:schemeClr val="dk1"/>
-          </a:effectRef>
-          <a:fontRef idx="minor">
-            <a:schemeClr val="dk1"/>
-          </a:fontRef>
-        </p:style>
-        <p:txBody>
-          <a:bodyPr rtlCol="0" anchor="ctr"/>
-          <a:lstStyle/>
-          <a:p>
-            <a:pPr algn="ctr"/>
-            <a:endParaRPr lang="en-US"/>
-          </a:p>
-        </p:txBody>
-      </p:sp>
-      <p:sp>
-        <p:nvSpPr>
-          <p:cNvPr id="28" name="TextBox 27">
-            <a:extLst>
-              <a:ext uri="{FF2B5EF4-FFF2-40B4-BE49-F238E27FC236}">
-                <a16:creationId xmlns:a16="http://schemas.microsoft.com/office/drawing/2014/main" id="{14E164BE-19D7-8744-8DC2-3159730751C1}"/>
-              </a:ext>
-            </a:extLst>
-          </p:cNvPr>
-          <p:cNvSpPr txBox="1"/>
-          <p:nvPr/>
-        </p:nvSpPr>
-        <p:spPr>
-          <a:xfrm>
-            <a:off x="362332" y="2766084"/>
-            <a:ext cx="661996" cy="338554"/>
-          </a:xfrm>
-          <a:prstGeom prst="rect">
-            <a:avLst/>
-          </a:prstGeom>
-          <a:noFill/>
-        </p:spPr>
-        <p:txBody>
-          <a:bodyPr wrap="square" rtlCol="0">
-            <a:spAutoFit/>
-          </a:bodyPr>
-          <a:lstStyle/>
-          <a:p>
-            <a:r>
-              <a:rPr lang="en-US" sz="1600" dirty="0"/>
-              <a:t>n = 1</a:t>
-            </a:r>
-          </a:p>
-        </p:txBody>
-      </p:sp>
-      <p:sp>
-        <p:nvSpPr>
-          <p:cNvPr id="29" name="Triangle 28">
-            <a:extLst>
-              <a:ext uri="{FF2B5EF4-FFF2-40B4-BE49-F238E27FC236}">
-                <a16:creationId xmlns:a16="http://schemas.microsoft.com/office/drawing/2014/main" id="{32ACC733-63DB-5742-8C0F-CEA9BC705EC0}"/>
-              </a:ext>
-            </a:extLst>
-          </p:cNvPr>
-          <p:cNvSpPr/>
-          <p:nvPr/>
-        </p:nvSpPr>
-        <p:spPr>
-          <a:xfrm>
-            <a:off x="173269" y="2848157"/>
-            <a:ext cx="202312" cy="174407"/>
-          </a:xfrm>
-          <a:prstGeom prst="triangle">
-            <a:avLst/>
-          </a:prstGeom>
-          <a:solidFill>
-            <a:schemeClr val="accent6">
-              <a:lumMod val="75000"/>
-            </a:schemeClr>
-          </a:solidFill>
-        </p:spPr>
-        <p:style>
-          <a:lnRef idx="2">
-            <a:schemeClr val="dk1"/>
-          </a:lnRef>
-          <a:fillRef idx="1">
-            <a:schemeClr val="lt1"/>
-          </a:fillRef>
-          <a:effectRef idx="0">
-            <a:schemeClr val="dk1"/>
-          </a:effectRef>
-          <a:fontRef idx="minor">
-            <a:schemeClr val="dk1"/>
-          </a:fontRef>
-        </p:style>
-        <p:txBody>
-          <a:bodyPr rtlCol="0" anchor="ctr"/>
-          <a:lstStyle/>
-          <a:p>
-            <a:pPr algn="ctr"/>
-            <a:endParaRPr lang="en-US"/>
-          </a:p>
-        </p:txBody>
-      </p:sp>
-      <p:sp>
-        <p:nvSpPr>
-          <p:cNvPr id="30" name="TextBox 29">
-            <a:extLst>
-              <a:ext uri="{FF2B5EF4-FFF2-40B4-BE49-F238E27FC236}">
-                <a16:creationId xmlns:a16="http://schemas.microsoft.com/office/drawing/2014/main" id="{A30EA329-4C5F-364D-8CF6-304DEC22CC3D}"/>
-              </a:ext>
-            </a:extLst>
-          </p:cNvPr>
-          <p:cNvSpPr txBox="1"/>
-          <p:nvPr/>
-        </p:nvSpPr>
-        <p:spPr>
-          <a:xfrm>
-            <a:off x="4930614" y="6072529"/>
-            <a:ext cx="661996" cy="338554"/>
-          </a:xfrm>
-          <a:prstGeom prst="rect">
-            <a:avLst/>
-          </a:prstGeom>
-          <a:noFill/>
-        </p:spPr>
-        <p:txBody>
-          <a:bodyPr wrap="square" rtlCol="0">
-            <a:spAutoFit/>
-          </a:bodyPr>
-          <a:lstStyle/>
-          <a:p>
-            <a:r>
-              <a:rPr lang="en-US" sz="1600" dirty="0"/>
-              <a:t>n = 2</a:t>
-            </a:r>
-          </a:p>
-        </p:txBody>
-      </p:sp>
-      <p:sp>
-        <p:nvSpPr>
-          <p:cNvPr id="31" name="Triangle 30">
-            <a:extLst>
-              <a:ext uri="{FF2B5EF4-FFF2-40B4-BE49-F238E27FC236}">
-                <a16:creationId xmlns:a16="http://schemas.microsoft.com/office/drawing/2014/main" id="{53BD9D50-A9B6-D948-8DB4-8CF3781D6D1F}"/>
-              </a:ext>
-            </a:extLst>
-          </p:cNvPr>
-          <p:cNvSpPr/>
-          <p:nvPr/>
-        </p:nvSpPr>
-        <p:spPr>
-          <a:xfrm>
-            <a:off x="4741551" y="6154602"/>
-            <a:ext cx="202312" cy="174407"/>
-          </a:xfrm>
-          <a:prstGeom prst="triangle">
-            <a:avLst/>
-          </a:prstGeom>
-          <a:solidFill>
-            <a:schemeClr val="accent6">
-              <a:lumMod val="75000"/>
-            </a:schemeClr>
-          </a:solidFill>
-        </p:spPr>
-        <p:style>
-          <a:lnRef idx="2">
-            <a:schemeClr val="dk1"/>
-          </a:lnRef>
-          <a:fillRef idx="1">
-            <a:schemeClr val="lt1"/>
-          </a:fillRef>
-          <a:effectRef idx="0">
-            <a:schemeClr val="dk1"/>
-          </a:effectRef>
-          <a:fontRef idx="minor">
-            <a:schemeClr val="dk1"/>
           </a:fontRef>
         </p:style>
         <p:txBody>
@@ -4358,7 +4615,7 @@
     </p:spTree>
     <p:extLst>
       <p:ext uri="{BB962C8B-B14F-4D97-AF65-F5344CB8AC3E}">
-        <p14:creationId xmlns:p14="http://schemas.microsoft.com/office/powerpoint/2010/main" val="3058228761"/>
+        <p14:creationId xmlns:p14="http://schemas.microsoft.com/office/powerpoint/2010/main" val="3929229578"/>
       </p:ext>
     </p:extLst>
   </p:cSld>

</xml_diff>